<commit_message>
UPDATE : template 수정
</commit_message>
<xml_diff>
--- a/template.pptx
+++ b/template.pptx
@@ -177,7 +177,7 @@
         </p:blipFill>
         <p:spPr>
           <a:xfrm>
-            <a:off x="0" y="0"/>
+            <a:off x="0" y="-156102"/>
             <a:ext cx="12192000" cy="6858000"/>
           </a:xfrm>
           <a:prstGeom prst="rect">
@@ -347,7 +347,7 @@
           <a:bodyPr/>
           <a:lstStyle>
             <a:lvl1pPr>
-              <a:defRPr sz="3100">
+              <a:defRPr sz="3600">
                 <a:solidFill>
                   <a:schemeClr val="bg1"/>
                 </a:solidFill>
@@ -387,16 +387,16 @@
           </a:xfrm>
         </p:spPr>
         <p:txBody>
-          <a:bodyPr/>
-          <a:lstStyle>
-            <a:lvl1pPr marL="0" indent="0">
-              <a:buNone/>
-              <a:defRPr sz="3100">
+          <a:bodyPr anchor="ctr"/>
+          <a:lstStyle>
+            <a:lvl1pPr marL="0" indent="0" algn="ctr">
+              <a:buNone/>
+              <a:defRPr sz="4400">
                 <a:solidFill>
                   <a:schemeClr val="bg1"/>
                 </a:solidFill>
-                <a:latin typeface="나눔스퀘어 ExtraBold" panose="020B0600000101010101" pitchFamily="50" charset="-127"/>
-                <a:ea typeface="나눔스퀘어 ExtraBold" panose="020B0600000101010101" pitchFamily="50" charset="-127"/>
+                <a:latin typeface="나눔스퀘어 Bold" panose="020B0600000101010101" pitchFamily="50" charset="-127"/>
+                <a:ea typeface="나눔스퀘어 Bold" panose="020B0600000101010101" pitchFamily="50" charset="-127"/>
               </a:defRPr>
             </a:lvl1pPr>
           </a:lstStyle>

</xml_diff>